<commit_message>
doc: add RM doc
</commit_message>
<xml_diff>
--- a/doc/README/vector-pic.pptx
+++ b/doc/README/vector-pic.pptx
@@ -6,6 +6,7 @@
   </p:sldMasterIdLst>
   <p:sldIdLst>
     <p:sldId id="256" r:id="rId2"/>
+    <p:sldId id="257" r:id="rId3"/>
   </p:sldIdLst>
   <p:sldSz cx="12192000" cy="6858000"/>
   <p:notesSz cx="6858000" cy="9144000"/>
@@ -259,7 +260,7 @@
           <a:p>
             <a:fld id="{FF5D845C-FD3A-47AA-A8B6-1BB8AE1C035C}" type="datetimeFigureOut">
               <a:rPr lang="zh-CN" altLang="en-US" smtClean="0"/>
-              <a:t>2022/6/11</a:t>
+              <a:t>2022/8/24</a:t>
             </a:fld>
             <a:endParaRPr lang="zh-CN" altLang="en-US"/>
           </a:p>
@@ -457,7 +458,7 @@
           <a:p>
             <a:fld id="{FF5D845C-FD3A-47AA-A8B6-1BB8AE1C035C}" type="datetimeFigureOut">
               <a:rPr lang="zh-CN" altLang="en-US" smtClean="0"/>
-              <a:t>2022/6/11</a:t>
+              <a:t>2022/8/24</a:t>
             </a:fld>
             <a:endParaRPr lang="zh-CN" altLang="en-US"/>
           </a:p>
@@ -665,7 +666,7 @@
           <a:p>
             <a:fld id="{FF5D845C-FD3A-47AA-A8B6-1BB8AE1C035C}" type="datetimeFigureOut">
               <a:rPr lang="zh-CN" altLang="en-US" smtClean="0"/>
-              <a:t>2022/6/11</a:t>
+              <a:t>2022/8/24</a:t>
             </a:fld>
             <a:endParaRPr lang="zh-CN" altLang="en-US"/>
           </a:p>
@@ -863,7 +864,7 @@
           <a:p>
             <a:fld id="{FF5D845C-FD3A-47AA-A8B6-1BB8AE1C035C}" type="datetimeFigureOut">
               <a:rPr lang="zh-CN" altLang="en-US" smtClean="0"/>
-              <a:t>2022/6/11</a:t>
+              <a:t>2022/8/24</a:t>
             </a:fld>
             <a:endParaRPr lang="zh-CN" altLang="en-US"/>
           </a:p>
@@ -1138,7 +1139,7 @@
           <a:p>
             <a:fld id="{FF5D845C-FD3A-47AA-A8B6-1BB8AE1C035C}" type="datetimeFigureOut">
               <a:rPr lang="zh-CN" altLang="en-US" smtClean="0"/>
-              <a:t>2022/6/11</a:t>
+              <a:t>2022/8/24</a:t>
             </a:fld>
             <a:endParaRPr lang="zh-CN" altLang="en-US"/>
           </a:p>
@@ -1403,7 +1404,7 @@
           <a:p>
             <a:fld id="{FF5D845C-FD3A-47AA-A8B6-1BB8AE1C035C}" type="datetimeFigureOut">
               <a:rPr lang="zh-CN" altLang="en-US" smtClean="0"/>
-              <a:t>2022/6/11</a:t>
+              <a:t>2022/8/24</a:t>
             </a:fld>
             <a:endParaRPr lang="zh-CN" altLang="en-US"/>
           </a:p>
@@ -1815,7 +1816,7 @@
           <a:p>
             <a:fld id="{FF5D845C-FD3A-47AA-A8B6-1BB8AE1C035C}" type="datetimeFigureOut">
               <a:rPr lang="zh-CN" altLang="en-US" smtClean="0"/>
-              <a:t>2022/6/11</a:t>
+              <a:t>2022/8/24</a:t>
             </a:fld>
             <a:endParaRPr lang="zh-CN" altLang="en-US"/>
           </a:p>
@@ -1956,7 +1957,7 @@
           <a:p>
             <a:fld id="{FF5D845C-FD3A-47AA-A8B6-1BB8AE1C035C}" type="datetimeFigureOut">
               <a:rPr lang="zh-CN" altLang="en-US" smtClean="0"/>
-              <a:t>2022/6/11</a:t>
+              <a:t>2022/8/24</a:t>
             </a:fld>
             <a:endParaRPr lang="zh-CN" altLang="en-US"/>
           </a:p>
@@ -2069,7 +2070,7 @@
           <a:p>
             <a:fld id="{FF5D845C-FD3A-47AA-A8B6-1BB8AE1C035C}" type="datetimeFigureOut">
               <a:rPr lang="zh-CN" altLang="en-US" smtClean="0"/>
-              <a:t>2022/6/11</a:t>
+              <a:t>2022/8/24</a:t>
             </a:fld>
             <a:endParaRPr lang="zh-CN" altLang="en-US"/>
           </a:p>
@@ -2380,7 +2381,7 @@
           <a:p>
             <a:fld id="{FF5D845C-FD3A-47AA-A8B6-1BB8AE1C035C}" type="datetimeFigureOut">
               <a:rPr lang="zh-CN" altLang="en-US" smtClean="0"/>
-              <a:t>2022/6/11</a:t>
+              <a:t>2022/8/24</a:t>
             </a:fld>
             <a:endParaRPr lang="zh-CN" altLang="en-US"/>
           </a:p>
@@ -2668,7 +2669,7 @@
           <a:p>
             <a:fld id="{FF5D845C-FD3A-47AA-A8B6-1BB8AE1C035C}" type="datetimeFigureOut">
               <a:rPr lang="zh-CN" altLang="en-US" smtClean="0"/>
-              <a:t>2022/6/11</a:t>
+              <a:t>2022/8/24</a:t>
             </a:fld>
             <a:endParaRPr lang="zh-CN" altLang="en-US"/>
           </a:p>
@@ -2909,7 +2910,7 @@
           <a:p>
             <a:fld id="{FF5D845C-FD3A-47AA-A8B6-1BB8AE1C035C}" type="datetimeFigureOut">
               <a:rPr lang="zh-CN" altLang="en-US" smtClean="0"/>
-              <a:t>2022/6/11</a:t>
+              <a:t>2022/8/24</a:t>
             </a:fld>
             <a:endParaRPr lang="zh-CN" altLang="en-US"/>
           </a:p>
@@ -4976,6 +4977,1973 @@
 </p:sld>
 </file>
 
+<file path=ppt/slides/slide2.xml><?xml version="1.0" encoding="utf-8"?>
+<p:sld xmlns:a="http://schemas.openxmlformats.org/drawingml/2006/main" xmlns:r="http://schemas.openxmlformats.org/officeDocument/2006/relationships" xmlns:p="http://schemas.openxmlformats.org/presentationml/2006/main">
+  <p:cSld>
+    <p:spTree>
+      <p:nvGrpSpPr>
+        <p:cNvPr id="1" name=""/>
+        <p:cNvGrpSpPr/>
+        <p:nvPr/>
+      </p:nvGrpSpPr>
+      <p:grpSpPr>
+        <a:xfrm>
+          <a:off x="0" y="0"/>
+          <a:ext cx="0" cy="0"/>
+          <a:chOff x="0" y="0"/>
+          <a:chExt cx="0" cy="0"/>
+        </a:xfrm>
+      </p:grpSpPr>
+      <p:sp>
+        <p:nvSpPr>
+          <p:cNvPr id="4" name="矩形 3">
+            <a:extLst>
+              <a:ext uri="{FF2B5EF4-FFF2-40B4-BE49-F238E27FC236}">
+                <a16:creationId xmlns:a16="http://schemas.microsoft.com/office/drawing/2014/main" id="{35654A8E-3091-4A8D-B9C4-E408E4676142}"/>
+              </a:ext>
+            </a:extLst>
+          </p:cNvPr>
+          <p:cNvSpPr/>
+          <p:nvPr/>
+        </p:nvSpPr>
+        <p:spPr>
+          <a:xfrm>
+            <a:off x="2105985" y="2047559"/>
+            <a:ext cx="1763949" cy="4066162"/>
+          </a:xfrm>
+          <a:prstGeom prst="rect">
+            <a:avLst/>
+          </a:prstGeom>
+        </p:spPr>
+        <p:style>
+          <a:lnRef idx="2">
+            <a:schemeClr val="accent3">
+              <a:shade val="50000"/>
+            </a:schemeClr>
+          </a:lnRef>
+          <a:fillRef idx="1">
+            <a:schemeClr val="accent3"/>
+          </a:fillRef>
+          <a:effectRef idx="0">
+            <a:schemeClr val="accent3"/>
+          </a:effectRef>
+          <a:fontRef idx="minor">
+            <a:schemeClr val="lt1"/>
+          </a:fontRef>
+        </p:style>
+        <p:txBody>
+          <a:bodyPr rtlCol="0" anchor="ctr"/>
+          <a:lstStyle/>
+          <a:p>
+            <a:pPr algn="ctr"/>
+            <a:endParaRPr lang="zh-CN" altLang="en-US" dirty="0"/>
+          </a:p>
+        </p:txBody>
+      </p:sp>
+      <p:sp>
+        <p:nvSpPr>
+          <p:cNvPr id="16" name="矩形: 圆角 15">
+            <a:extLst>
+              <a:ext uri="{FF2B5EF4-FFF2-40B4-BE49-F238E27FC236}">
+                <a16:creationId xmlns:a16="http://schemas.microsoft.com/office/drawing/2014/main" id="{9CF06909-E5BA-40E2-83B2-0900A1F0C8E7}"/>
+              </a:ext>
+            </a:extLst>
+          </p:cNvPr>
+          <p:cNvSpPr/>
+          <p:nvPr/>
+        </p:nvSpPr>
+        <p:spPr>
+          <a:xfrm>
+            <a:off x="2105985" y="2047558"/>
+            <a:ext cx="1763949" cy="1437319"/>
+          </a:xfrm>
+          <a:prstGeom prst="roundRect">
+            <a:avLst/>
+          </a:prstGeom>
+        </p:spPr>
+        <p:style>
+          <a:lnRef idx="1">
+            <a:schemeClr val="accent4"/>
+          </a:lnRef>
+          <a:fillRef idx="2">
+            <a:schemeClr val="accent4"/>
+          </a:fillRef>
+          <a:effectRef idx="1">
+            <a:schemeClr val="accent4"/>
+          </a:effectRef>
+          <a:fontRef idx="minor">
+            <a:schemeClr val="dk1"/>
+          </a:fontRef>
+        </p:style>
+        <p:txBody>
+          <a:bodyPr rtlCol="0" anchor="ctr"/>
+          <a:lstStyle/>
+          <a:p>
+            <a:pPr algn="ctr"/>
+            <a:endParaRPr lang="zh-CN" altLang="en-US"/>
+          </a:p>
+        </p:txBody>
+      </p:sp>
+      <p:sp>
+        <p:nvSpPr>
+          <p:cNvPr id="10" name="文本框 9">
+            <a:extLst>
+              <a:ext uri="{FF2B5EF4-FFF2-40B4-BE49-F238E27FC236}">
+                <a16:creationId xmlns:a16="http://schemas.microsoft.com/office/drawing/2014/main" id="{F9DE1846-212C-4ABD-ABAE-4C5E2E8B0844}"/>
+              </a:ext>
+            </a:extLst>
+          </p:cNvPr>
+          <p:cNvSpPr txBox="1"/>
+          <p:nvPr/>
+        </p:nvSpPr>
+        <p:spPr>
+          <a:xfrm>
+            <a:off x="2130505" y="2058089"/>
+            <a:ext cx="1664412" cy="338554"/>
+          </a:xfrm>
+          <a:prstGeom prst="rect">
+            <a:avLst/>
+          </a:prstGeom>
+          <a:noFill/>
+        </p:spPr>
+        <p:txBody>
+          <a:bodyPr wrap="square" rtlCol="0">
+            <a:spAutoFit/>
+          </a:bodyPr>
+          <a:lstStyle/>
+          <a:p>
+            <a:r>
+              <a:rPr lang="en-US" altLang="zh-CN" sz="1600" b="1" dirty="0" err="1"/>
+              <a:t>recordSize</a:t>
+            </a:r>
+            <a:endParaRPr lang="zh-CN" altLang="en-US" sz="1600" b="1" dirty="0"/>
+          </a:p>
+        </p:txBody>
+      </p:sp>
+      <p:sp>
+        <p:nvSpPr>
+          <p:cNvPr id="11" name="文本框 10">
+            <a:extLst>
+              <a:ext uri="{FF2B5EF4-FFF2-40B4-BE49-F238E27FC236}">
+                <a16:creationId xmlns:a16="http://schemas.microsoft.com/office/drawing/2014/main" id="{F742D656-6299-4491-942B-928DD59EC0FC}"/>
+              </a:ext>
+            </a:extLst>
+          </p:cNvPr>
+          <p:cNvSpPr txBox="1"/>
+          <p:nvPr/>
+        </p:nvSpPr>
+        <p:spPr>
+          <a:xfrm>
+            <a:off x="2066016" y="2461622"/>
+            <a:ext cx="2058718" cy="307777"/>
+          </a:xfrm>
+          <a:prstGeom prst="rect">
+            <a:avLst/>
+          </a:prstGeom>
+          <a:noFill/>
+        </p:spPr>
+        <p:txBody>
+          <a:bodyPr wrap="square" rtlCol="0">
+            <a:spAutoFit/>
+          </a:bodyPr>
+          <a:lstStyle/>
+          <a:p>
+            <a:r>
+              <a:rPr lang="en-US" altLang="zh-CN" sz="1400" b="1" dirty="0" err="1"/>
+              <a:t>numRecordsPerPage</a:t>
+            </a:r>
+            <a:endParaRPr lang="zh-CN" altLang="en-US" sz="1400" b="1" dirty="0"/>
+          </a:p>
+        </p:txBody>
+      </p:sp>
+      <p:cxnSp>
+        <p:nvCxnSpPr>
+          <p:cNvPr id="7" name="直接连接符 6">
+            <a:extLst>
+              <a:ext uri="{FF2B5EF4-FFF2-40B4-BE49-F238E27FC236}">
+                <a16:creationId xmlns:a16="http://schemas.microsoft.com/office/drawing/2014/main" id="{3C7752AA-C1FF-4519-A2DD-3D2F8B300A3F}"/>
+              </a:ext>
+            </a:extLst>
+          </p:cNvPr>
+          <p:cNvCxnSpPr>
+            <a:cxnSpLocks/>
+          </p:cNvCxnSpPr>
+          <p:nvPr/>
+        </p:nvCxnSpPr>
+        <p:spPr>
+          <a:xfrm>
+            <a:off x="2105985" y="2428236"/>
+            <a:ext cx="1763949" cy="0"/>
+          </a:xfrm>
+          <a:prstGeom prst="line">
+            <a:avLst/>
+          </a:prstGeom>
+        </p:spPr>
+        <p:style>
+          <a:lnRef idx="1">
+            <a:schemeClr val="accent1"/>
+          </a:lnRef>
+          <a:fillRef idx="0">
+            <a:schemeClr val="accent1"/>
+          </a:fillRef>
+          <a:effectRef idx="0">
+            <a:schemeClr val="accent1"/>
+          </a:effectRef>
+          <a:fontRef idx="minor">
+            <a:schemeClr val="tx1"/>
+          </a:fontRef>
+        </p:style>
+      </p:cxnSp>
+      <p:cxnSp>
+        <p:nvCxnSpPr>
+          <p:cNvPr id="19" name="直接连接符 18">
+            <a:extLst>
+              <a:ext uri="{FF2B5EF4-FFF2-40B4-BE49-F238E27FC236}">
+                <a16:creationId xmlns:a16="http://schemas.microsoft.com/office/drawing/2014/main" id="{20F30684-751E-41A9-BEDE-A2EAD0FE77F0}"/>
+              </a:ext>
+            </a:extLst>
+          </p:cNvPr>
+          <p:cNvCxnSpPr>
+            <a:cxnSpLocks/>
+          </p:cNvCxnSpPr>
+          <p:nvPr/>
+        </p:nvCxnSpPr>
+        <p:spPr>
+          <a:xfrm>
+            <a:off x="1137673" y="2047558"/>
+            <a:ext cx="888329" cy="0"/>
+          </a:xfrm>
+          <a:prstGeom prst="line">
+            <a:avLst/>
+          </a:prstGeom>
+        </p:spPr>
+        <p:style>
+          <a:lnRef idx="1">
+            <a:schemeClr val="accent1"/>
+          </a:lnRef>
+          <a:fillRef idx="0">
+            <a:schemeClr val="accent1"/>
+          </a:fillRef>
+          <a:effectRef idx="0">
+            <a:schemeClr val="accent1"/>
+          </a:effectRef>
+          <a:fontRef idx="minor">
+            <a:schemeClr val="tx1"/>
+          </a:fontRef>
+        </p:style>
+      </p:cxnSp>
+      <p:cxnSp>
+        <p:nvCxnSpPr>
+          <p:cNvPr id="20" name="直接连接符 19">
+            <a:extLst>
+              <a:ext uri="{FF2B5EF4-FFF2-40B4-BE49-F238E27FC236}">
+                <a16:creationId xmlns:a16="http://schemas.microsoft.com/office/drawing/2014/main" id="{DE61B048-D027-41BB-AD81-2E551A4010BC}"/>
+              </a:ext>
+            </a:extLst>
+          </p:cNvPr>
+          <p:cNvCxnSpPr>
+            <a:cxnSpLocks/>
+          </p:cNvCxnSpPr>
+          <p:nvPr/>
+        </p:nvCxnSpPr>
+        <p:spPr>
+          <a:xfrm>
+            <a:off x="1137673" y="6112828"/>
+            <a:ext cx="551234" cy="0"/>
+          </a:xfrm>
+          <a:prstGeom prst="line">
+            <a:avLst/>
+          </a:prstGeom>
+        </p:spPr>
+        <p:style>
+          <a:lnRef idx="1">
+            <a:schemeClr val="accent1"/>
+          </a:lnRef>
+          <a:fillRef idx="0">
+            <a:schemeClr val="accent1"/>
+          </a:fillRef>
+          <a:effectRef idx="0">
+            <a:schemeClr val="accent1"/>
+          </a:effectRef>
+          <a:fontRef idx="minor">
+            <a:schemeClr val="tx1"/>
+          </a:fontRef>
+        </p:style>
+      </p:cxnSp>
+      <p:sp>
+        <p:nvSpPr>
+          <p:cNvPr id="21" name="文本框 20">
+            <a:extLst>
+              <a:ext uri="{FF2B5EF4-FFF2-40B4-BE49-F238E27FC236}">
+                <a16:creationId xmlns:a16="http://schemas.microsoft.com/office/drawing/2014/main" id="{D2164C30-2075-45AC-A2DC-93EAF76D29CA}"/>
+              </a:ext>
+            </a:extLst>
+          </p:cNvPr>
+          <p:cNvSpPr txBox="1"/>
+          <p:nvPr/>
+        </p:nvSpPr>
+        <p:spPr>
+          <a:xfrm>
+            <a:off x="1013981" y="3910917"/>
+            <a:ext cx="798617" cy="276999"/>
+          </a:xfrm>
+          <a:prstGeom prst="rect">
+            <a:avLst/>
+          </a:prstGeom>
+          <a:noFill/>
+        </p:spPr>
+        <p:txBody>
+          <a:bodyPr wrap="square" rtlCol="0">
+            <a:spAutoFit/>
+          </a:bodyPr>
+          <a:lstStyle/>
+          <a:p>
+            <a:r>
+              <a:rPr lang="en-US" altLang="zh-CN" sz="1200" dirty="0"/>
+              <a:t>409</a:t>
+            </a:r>
+            <a:r>
+              <a:rPr lang="en-US" altLang="zh-CN" sz="1200" b="1" dirty="0"/>
+              <a:t>2</a:t>
+            </a:r>
+            <a:r>
+              <a:rPr lang="en-US" altLang="zh-CN" sz="1200" dirty="0"/>
+              <a:t>Byte</a:t>
+            </a:r>
+            <a:endParaRPr lang="zh-CN" altLang="en-US" sz="1200" dirty="0"/>
+          </a:p>
+        </p:txBody>
+      </p:sp>
+      <p:cxnSp>
+        <p:nvCxnSpPr>
+          <p:cNvPr id="23" name="直接箭头连接符 22">
+            <a:extLst>
+              <a:ext uri="{FF2B5EF4-FFF2-40B4-BE49-F238E27FC236}">
+                <a16:creationId xmlns:a16="http://schemas.microsoft.com/office/drawing/2014/main" id="{274EEB3A-0DDF-4FD7-87D5-D6E5B14F8010}"/>
+              </a:ext>
+            </a:extLst>
+          </p:cNvPr>
+          <p:cNvCxnSpPr>
+            <a:cxnSpLocks/>
+          </p:cNvCxnSpPr>
+          <p:nvPr/>
+        </p:nvCxnSpPr>
+        <p:spPr>
+          <a:xfrm flipV="1">
+            <a:off x="1413290" y="2047558"/>
+            <a:ext cx="3586" cy="1863359"/>
+          </a:xfrm>
+          <a:prstGeom prst="straightConnector1">
+            <a:avLst/>
+          </a:prstGeom>
+          <a:ln>
+            <a:tailEnd type="triangle"/>
+          </a:ln>
+        </p:spPr>
+        <p:style>
+          <a:lnRef idx="1">
+            <a:schemeClr val="accent1"/>
+          </a:lnRef>
+          <a:fillRef idx="0">
+            <a:schemeClr val="accent1"/>
+          </a:fillRef>
+          <a:effectRef idx="0">
+            <a:schemeClr val="accent1"/>
+          </a:effectRef>
+          <a:fontRef idx="minor">
+            <a:schemeClr val="tx1"/>
+          </a:fontRef>
+        </p:style>
+      </p:cxnSp>
+      <p:cxnSp>
+        <p:nvCxnSpPr>
+          <p:cNvPr id="24" name="直接箭头连接符 23">
+            <a:extLst>
+              <a:ext uri="{FF2B5EF4-FFF2-40B4-BE49-F238E27FC236}">
+                <a16:creationId xmlns:a16="http://schemas.microsoft.com/office/drawing/2014/main" id="{9FF81901-3192-4609-9947-92209A533385}"/>
+              </a:ext>
+            </a:extLst>
+          </p:cNvPr>
+          <p:cNvCxnSpPr>
+            <a:cxnSpLocks/>
+          </p:cNvCxnSpPr>
+          <p:nvPr/>
+        </p:nvCxnSpPr>
+        <p:spPr>
+          <a:xfrm flipH="1">
+            <a:off x="1416876" y="4213415"/>
+            <a:ext cx="1" cy="1899413"/>
+          </a:xfrm>
+          <a:prstGeom prst="straightConnector1">
+            <a:avLst/>
+          </a:prstGeom>
+          <a:ln>
+            <a:tailEnd type="triangle"/>
+          </a:ln>
+        </p:spPr>
+        <p:style>
+          <a:lnRef idx="1">
+            <a:schemeClr val="accent1"/>
+          </a:lnRef>
+          <a:fillRef idx="0">
+            <a:schemeClr val="accent1"/>
+          </a:fillRef>
+          <a:effectRef idx="0">
+            <a:schemeClr val="accent1"/>
+          </a:effectRef>
+          <a:fontRef idx="minor">
+            <a:schemeClr val="tx1"/>
+          </a:fontRef>
+        </p:style>
+      </p:cxnSp>
+      <p:cxnSp>
+        <p:nvCxnSpPr>
+          <p:cNvPr id="33" name="直接连接符 32">
+            <a:extLst>
+              <a:ext uri="{FF2B5EF4-FFF2-40B4-BE49-F238E27FC236}">
+                <a16:creationId xmlns:a16="http://schemas.microsoft.com/office/drawing/2014/main" id="{A0AA0033-49F2-433D-96CC-4AD9A3CD5935}"/>
+              </a:ext>
+            </a:extLst>
+          </p:cNvPr>
+          <p:cNvCxnSpPr>
+            <a:cxnSpLocks/>
+          </p:cNvCxnSpPr>
+          <p:nvPr/>
+        </p:nvCxnSpPr>
+        <p:spPr>
+          <a:xfrm>
+            <a:off x="1529686" y="3484877"/>
+            <a:ext cx="424234" cy="0"/>
+          </a:xfrm>
+          <a:prstGeom prst="line">
+            <a:avLst/>
+          </a:prstGeom>
+        </p:spPr>
+        <p:style>
+          <a:lnRef idx="1">
+            <a:schemeClr val="accent1"/>
+          </a:lnRef>
+          <a:fillRef idx="0">
+            <a:schemeClr val="accent1"/>
+          </a:fillRef>
+          <a:effectRef idx="0">
+            <a:schemeClr val="accent1"/>
+          </a:effectRef>
+          <a:fontRef idx="minor">
+            <a:schemeClr val="tx1"/>
+          </a:fontRef>
+        </p:style>
+      </p:cxnSp>
+      <p:sp>
+        <p:nvSpPr>
+          <p:cNvPr id="35" name="文本框 34">
+            <a:extLst>
+              <a:ext uri="{FF2B5EF4-FFF2-40B4-BE49-F238E27FC236}">
+                <a16:creationId xmlns:a16="http://schemas.microsoft.com/office/drawing/2014/main" id="{4B561A8E-2979-478F-B830-6E70D3BCCEAF}"/>
+              </a:ext>
+            </a:extLst>
+          </p:cNvPr>
+          <p:cNvSpPr txBox="1"/>
+          <p:nvPr/>
+        </p:nvSpPr>
+        <p:spPr>
+          <a:xfrm>
+            <a:off x="1410721" y="2686833"/>
+            <a:ext cx="651649" cy="276999"/>
+          </a:xfrm>
+          <a:prstGeom prst="rect">
+            <a:avLst/>
+          </a:prstGeom>
+          <a:noFill/>
+        </p:spPr>
+        <p:txBody>
+          <a:bodyPr wrap="square" rtlCol="0">
+            <a:spAutoFit/>
+          </a:bodyPr>
+          <a:lstStyle/>
+          <a:p>
+            <a:r>
+              <a:rPr lang="en-US" altLang="zh-CN" sz="1200" dirty="0"/>
+              <a:t>16Byte</a:t>
+            </a:r>
+            <a:endParaRPr lang="zh-CN" altLang="en-US" sz="1200" dirty="0"/>
+          </a:p>
+        </p:txBody>
+      </p:sp>
+      <p:cxnSp>
+        <p:nvCxnSpPr>
+          <p:cNvPr id="36" name="直接箭头连接符 35">
+            <a:extLst>
+              <a:ext uri="{FF2B5EF4-FFF2-40B4-BE49-F238E27FC236}">
+                <a16:creationId xmlns:a16="http://schemas.microsoft.com/office/drawing/2014/main" id="{7B443C81-2B1E-47E2-B5CA-4D519B201EDB}"/>
+              </a:ext>
+            </a:extLst>
+          </p:cNvPr>
+          <p:cNvCxnSpPr>
+            <a:cxnSpLocks/>
+            <a:stCxn id="35" idx="0"/>
+          </p:cNvCxnSpPr>
+          <p:nvPr/>
+        </p:nvCxnSpPr>
+        <p:spPr>
+          <a:xfrm flipV="1">
+            <a:off x="1736546" y="2041463"/>
+            <a:ext cx="0" cy="645370"/>
+          </a:xfrm>
+          <a:prstGeom prst="straightConnector1">
+            <a:avLst/>
+          </a:prstGeom>
+          <a:ln>
+            <a:tailEnd type="triangle"/>
+          </a:ln>
+        </p:spPr>
+        <p:style>
+          <a:lnRef idx="1">
+            <a:schemeClr val="accent1"/>
+          </a:lnRef>
+          <a:fillRef idx="0">
+            <a:schemeClr val="accent1"/>
+          </a:fillRef>
+          <a:effectRef idx="0">
+            <a:schemeClr val="accent1"/>
+          </a:effectRef>
+          <a:fontRef idx="minor">
+            <a:schemeClr val="tx1"/>
+          </a:fontRef>
+        </p:style>
+      </p:cxnSp>
+      <p:cxnSp>
+        <p:nvCxnSpPr>
+          <p:cNvPr id="40" name="直接箭头连接符 39">
+            <a:extLst>
+              <a:ext uri="{FF2B5EF4-FFF2-40B4-BE49-F238E27FC236}">
+                <a16:creationId xmlns:a16="http://schemas.microsoft.com/office/drawing/2014/main" id="{847BEC08-B6EC-4776-BB63-CB6F36508883}"/>
+              </a:ext>
+            </a:extLst>
+          </p:cNvPr>
+          <p:cNvCxnSpPr>
+            <a:cxnSpLocks/>
+            <a:stCxn id="35" idx="2"/>
+          </p:cNvCxnSpPr>
+          <p:nvPr/>
+        </p:nvCxnSpPr>
+        <p:spPr>
+          <a:xfrm>
+            <a:off x="1736546" y="2963832"/>
+            <a:ext cx="1641" cy="519959"/>
+          </a:xfrm>
+          <a:prstGeom prst="straightConnector1">
+            <a:avLst/>
+          </a:prstGeom>
+          <a:ln>
+            <a:tailEnd type="triangle"/>
+          </a:ln>
+        </p:spPr>
+        <p:style>
+          <a:lnRef idx="1">
+            <a:schemeClr val="accent1"/>
+          </a:lnRef>
+          <a:fillRef idx="0">
+            <a:schemeClr val="accent1"/>
+          </a:fillRef>
+          <a:effectRef idx="0">
+            <a:schemeClr val="accent1"/>
+          </a:effectRef>
+          <a:fontRef idx="minor">
+            <a:schemeClr val="tx1"/>
+          </a:fontRef>
+        </p:style>
+      </p:cxnSp>
+      <p:sp>
+        <p:nvSpPr>
+          <p:cNvPr id="43" name="矩形 42">
+            <a:extLst>
+              <a:ext uri="{FF2B5EF4-FFF2-40B4-BE49-F238E27FC236}">
+                <a16:creationId xmlns:a16="http://schemas.microsoft.com/office/drawing/2014/main" id="{7DE290DF-DE33-486C-AAE9-A46D54F4863F}"/>
+              </a:ext>
+            </a:extLst>
+          </p:cNvPr>
+          <p:cNvSpPr/>
+          <p:nvPr/>
+        </p:nvSpPr>
+        <p:spPr>
+          <a:xfrm>
+            <a:off x="4287012" y="2046666"/>
+            <a:ext cx="1763949" cy="4066162"/>
+          </a:xfrm>
+          <a:prstGeom prst="rect">
+            <a:avLst/>
+          </a:prstGeom>
+          <a:solidFill>
+            <a:schemeClr val="accent5">
+              <a:lumMod val="20000"/>
+              <a:lumOff val="80000"/>
+            </a:schemeClr>
+          </a:solidFill>
+        </p:spPr>
+        <p:style>
+          <a:lnRef idx="2">
+            <a:schemeClr val="accent3">
+              <a:shade val="50000"/>
+            </a:schemeClr>
+          </a:lnRef>
+          <a:fillRef idx="1">
+            <a:schemeClr val="accent3"/>
+          </a:fillRef>
+          <a:effectRef idx="0">
+            <a:schemeClr val="accent3"/>
+          </a:effectRef>
+          <a:fontRef idx="minor">
+            <a:schemeClr val="lt1"/>
+          </a:fontRef>
+        </p:style>
+        <p:txBody>
+          <a:bodyPr rtlCol="0" anchor="ctr"/>
+          <a:lstStyle/>
+          <a:p>
+            <a:pPr algn="ctr"/>
+            <a:endParaRPr lang="zh-CN" altLang="en-US" dirty="0"/>
+          </a:p>
+        </p:txBody>
+      </p:sp>
+      <p:sp>
+        <p:nvSpPr>
+          <p:cNvPr id="44" name="文本框 43">
+            <a:extLst>
+              <a:ext uri="{FF2B5EF4-FFF2-40B4-BE49-F238E27FC236}">
+                <a16:creationId xmlns:a16="http://schemas.microsoft.com/office/drawing/2014/main" id="{5D682BF7-A94E-4994-96A9-D179E6EF6594}"/>
+              </a:ext>
+            </a:extLst>
+          </p:cNvPr>
+          <p:cNvSpPr txBox="1"/>
+          <p:nvPr/>
+        </p:nvSpPr>
+        <p:spPr>
+          <a:xfrm>
+            <a:off x="4506642" y="1542072"/>
+            <a:ext cx="1324681" cy="338554"/>
+          </a:xfrm>
+          <a:prstGeom prst="rect">
+            <a:avLst/>
+          </a:prstGeom>
+          <a:noFill/>
+        </p:spPr>
+        <p:txBody>
+          <a:bodyPr wrap="square" rtlCol="0">
+            <a:spAutoFit/>
+          </a:bodyPr>
+          <a:lstStyle/>
+          <a:p>
+            <a:r>
+              <a:rPr lang="en-US" altLang="zh-CN" sz="1600" dirty="0"/>
+              <a:t>Data Page 0</a:t>
+            </a:r>
+            <a:endParaRPr lang="zh-CN" altLang="en-US" sz="1600" dirty="0"/>
+          </a:p>
+        </p:txBody>
+      </p:sp>
+      <p:sp>
+        <p:nvSpPr>
+          <p:cNvPr id="45" name="矩形: 圆角 44">
+            <a:extLst>
+              <a:ext uri="{FF2B5EF4-FFF2-40B4-BE49-F238E27FC236}">
+                <a16:creationId xmlns:a16="http://schemas.microsoft.com/office/drawing/2014/main" id="{D73D31B2-1732-40B3-BECD-13ED11DD98DA}"/>
+              </a:ext>
+            </a:extLst>
+          </p:cNvPr>
+          <p:cNvSpPr/>
+          <p:nvPr/>
+        </p:nvSpPr>
+        <p:spPr>
+          <a:xfrm>
+            <a:off x="4287009" y="2041463"/>
+            <a:ext cx="1763949" cy="380675"/>
+          </a:xfrm>
+          <a:prstGeom prst="roundRect">
+            <a:avLst/>
+          </a:prstGeom>
+        </p:spPr>
+        <p:style>
+          <a:lnRef idx="1">
+            <a:schemeClr val="accent4"/>
+          </a:lnRef>
+          <a:fillRef idx="2">
+            <a:schemeClr val="accent4"/>
+          </a:fillRef>
+          <a:effectRef idx="1">
+            <a:schemeClr val="accent4"/>
+          </a:effectRef>
+          <a:fontRef idx="minor">
+            <a:schemeClr val="dk1"/>
+          </a:fontRef>
+        </p:style>
+        <p:txBody>
+          <a:bodyPr rtlCol="0" anchor="ctr"/>
+          <a:lstStyle/>
+          <a:p>
+            <a:pPr algn="ctr"/>
+            <a:endParaRPr lang="zh-CN" altLang="en-US"/>
+          </a:p>
+        </p:txBody>
+      </p:sp>
+      <p:sp>
+        <p:nvSpPr>
+          <p:cNvPr id="46" name="文本框 45">
+            <a:extLst>
+              <a:ext uri="{FF2B5EF4-FFF2-40B4-BE49-F238E27FC236}">
+                <a16:creationId xmlns:a16="http://schemas.microsoft.com/office/drawing/2014/main" id="{2F17A4F7-C170-4872-A895-89123750316B}"/>
+              </a:ext>
+            </a:extLst>
+          </p:cNvPr>
+          <p:cNvSpPr txBox="1"/>
+          <p:nvPr/>
+        </p:nvSpPr>
+        <p:spPr>
+          <a:xfrm>
+            <a:off x="4283420" y="2063912"/>
+            <a:ext cx="1948263" cy="338554"/>
+          </a:xfrm>
+          <a:prstGeom prst="rect">
+            <a:avLst/>
+          </a:prstGeom>
+          <a:noFill/>
+        </p:spPr>
+        <p:txBody>
+          <a:bodyPr wrap="square" rtlCol="0">
+            <a:spAutoFit/>
+          </a:bodyPr>
+          <a:lstStyle/>
+          <a:p>
+            <a:r>
+              <a:rPr lang="en-US" altLang="zh-CN" sz="1600" dirty="0" err="1"/>
+              <a:t>nextFreePage</a:t>
+            </a:r>
+            <a:r>
+              <a:rPr lang="zh-CN" altLang="en-US" sz="1600" dirty="0"/>
+              <a:t>：</a:t>
+            </a:r>
+            <a:r>
+              <a:rPr lang="en-US" altLang="zh-CN" sz="1600" dirty="0"/>
+              <a:t>2</a:t>
+            </a:r>
+            <a:endParaRPr lang="zh-CN" altLang="en-US" sz="1600" dirty="0"/>
+          </a:p>
+        </p:txBody>
+      </p:sp>
+      <p:sp>
+        <p:nvSpPr>
+          <p:cNvPr id="48" name="矩形 47">
+            <a:extLst>
+              <a:ext uri="{FF2B5EF4-FFF2-40B4-BE49-F238E27FC236}">
+                <a16:creationId xmlns:a16="http://schemas.microsoft.com/office/drawing/2014/main" id="{D5E8254E-ED42-4E08-AA86-2EACB0A0834F}"/>
+              </a:ext>
+            </a:extLst>
+          </p:cNvPr>
+          <p:cNvSpPr/>
+          <p:nvPr/>
+        </p:nvSpPr>
+        <p:spPr>
+          <a:xfrm>
+            <a:off x="6669470" y="2041463"/>
+            <a:ext cx="1763949" cy="4066162"/>
+          </a:xfrm>
+          <a:prstGeom prst="rect">
+            <a:avLst/>
+          </a:prstGeom>
+          <a:solidFill>
+            <a:schemeClr val="accent1">
+              <a:lumMod val="40000"/>
+              <a:lumOff val="60000"/>
+            </a:schemeClr>
+          </a:solidFill>
+        </p:spPr>
+        <p:style>
+          <a:lnRef idx="2">
+            <a:schemeClr val="accent3">
+              <a:shade val="50000"/>
+            </a:schemeClr>
+          </a:lnRef>
+          <a:fillRef idx="1">
+            <a:schemeClr val="accent3"/>
+          </a:fillRef>
+          <a:effectRef idx="0">
+            <a:schemeClr val="accent3"/>
+          </a:effectRef>
+          <a:fontRef idx="minor">
+            <a:schemeClr val="lt1"/>
+          </a:fontRef>
+        </p:style>
+        <p:txBody>
+          <a:bodyPr rtlCol="0" anchor="ctr"/>
+          <a:lstStyle/>
+          <a:p>
+            <a:pPr algn="ctr"/>
+            <a:endParaRPr lang="zh-CN" altLang="en-US" dirty="0"/>
+          </a:p>
+        </p:txBody>
+      </p:sp>
+      <p:sp>
+        <p:nvSpPr>
+          <p:cNvPr id="49" name="文本框 48">
+            <a:extLst>
+              <a:ext uri="{FF2B5EF4-FFF2-40B4-BE49-F238E27FC236}">
+                <a16:creationId xmlns:a16="http://schemas.microsoft.com/office/drawing/2014/main" id="{6A584A30-8A5C-4459-B551-1BAF1091B906}"/>
+              </a:ext>
+            </a:extLst>
+          </p:cNvPr>
+          <p:cNvSpPr txBox="1"/>
+          <p:nvPr/>
+        </p:nvSpPr>
+        <p:spPr>
+          <a:xfrm>
+            <a:off x="6878064" y="1542072"/>
+            <a:ext cx="1346747" cy="338554"/>
+          </a:xfrm>
+          <a:prstGeom prst="rect">
+            <a:avLst/>
+          </a:prstGeom>
+          <a:noFill/>
+        </p:spPr>
+        <p:txBody>
+          <a:bodyPr wrap="square" rtlCol="0">
+            <a:spAutoFit/>
+          </a:bodyPr>
+          <a:lstStyle/>
+          <a:p>
+            <a:r>
+              <a:rPr lang="en-US" altLang="zh-CN" sz="1600" dirty="0"/>
+              <a:t>Data Page 1</a:t>
+            </a:r>
+            <a:endParaRPr lang="zh-CN" altLang="en-US" sz="1600" dirty="0"/>
+          </a:p>
+        </p:txBody>
+      </p:sp>
+      <p:sp>
+        <p:nvSpPr>
+          <p:cNvPr id="50" name="矩形: 圆角 49">
+            <a:extLst>
+              <a:ext uri="{FF2B5EF4-FFF2-40B4-BE49-F238E27FC236}">
+                <a16:creationId xmlns:a16="http://schemas.microsoft.com/office/drawing/2014/main" id="{53EA5D47-D480-421D-9BE9-91536AA4349F}"/>
+              </a:ext>
+            </a:extLst>
+          </p:cNvPr>
+          <p:cNvSpPr/>
+          <p:nvPr/>
+        </p:nvSpPr>
+        <p:spPr>
+          <a:xfrm>
+            <a:off x="6669467" y="2036260"/>
+            <a:ext cx="1763949" cy="380675"/>
+          </a:xfrm>
+          <a:prstGeom prst="roundRect">
+            <a:avLst/>
+          </a:prstGeom>
+        </p:spPr>
+        <p:style>
+          <a:lnRef idx="1">
+            <a:schemeClr val="accent4"/>
+          </a:lnRef>
+          <a:fillRef idx="2">
+            <a:schemeClr val="accent4"/>
+          </a:fillRef>
+          <a:effectRef idx="1">
+            <a:schemeClr val="accent4"/>
+          </a:effectRef>
+          <a:fontRef idx="minor">
+            <a:schemeClr val="dk1"/>
+          </a:fontRef>
+        </p:style>
+        <p:txBody>
+          <a:bodyPr rtlCol="0" anchor="ctr"/>
+          <a:lstStyle/>
+          <a:p>
+            <a:pPr algn="ctr"/>
+            <a:endParaRPr lang="zh-CN" altLang="en-US"/>
+          </a:p>
+        </p:txBody>
+      </p:sp>
+      <p:sp>
+        <p:nvSpPr>
+          <p:cNvPr id="51" name="文本框 50">
+            <a:extLst>
+              <a:ext uri="{FF2B5EF4-FFF2-40B4-BE49-F238E27FC236}">
+                <a16:creationId xmlns:a16="http://schemas.microsoft.com/office/drawing/2014/main" id="{369DBCB3-2FCA-41FC-950F-E39A83D6850C}"/>
+              </a:ext>
+            </a:extLst>
+          </p:cNvPr>
+          <p:cNvSpPr txBox="1"/>
+          <p:nvPr/>
+        </p:nvSpPr>
+        <p:spPr>
+          <a:xfrm>
+            <a:off x="7306503" y="4018639"/>
+            <a:ext cx="686294" cy="338554"/>
+          </a:xfrm>
+          <a:prstGeom prst="rect">
+            <a:avLst/>
+          </a:prstGeom>
+          <a:noFill/>
+        </p:spPr>
+        <p:txBody>
+          <a:bodyPr wrap="square" rtlCol="0">
+            <a:spAutoFit/>
+          </a:bodyPr>
+          <a:lstStyle/>
+          <a:p>
+            <a:r>
+              <a:rPr lang="en-US" altLang="zh-CN" sz="1600" dirty="0"/>
+              <a:t>data</a:t>
+            </a:r>
+            <a:endParaRPr lang="zh-CN" altLang="en-US" sz="1600" dirty="0"/>
+          </a:p>
+        </p:txBody>
+      </p:sp>
+      <p:sp>
+        <p:nvSpPr>
+          <p:cNvPr id="52" name="矩形 51">
+            <a:extLst>
+              <a:ext uri="{FF2B5EF4-FFF2-40B4-BE49-F238E27FC236}">
+                <a16:creationId xmlns:a16="http://schemas.microsoft.com/office/drawing/2014/main" id="{7140D921-7875-4F98-8A59-2BE87EC4A250}"/>
+              </a:ext>
+            </a:extLst>
+          </p:cNvPr>
+          <p:cNvSpPr/>
+          <p:nvPr/>
+        </p:nvSpPr>
+        <p:spPr>
+          <a:xfrm>
+            <a:off x="8871197" y="2041463"/>
+            <a:ext cx="1763949" cy="4066162"/>
+          </a:xfrm>
+          <a:prstGeom prst="rect">
+            <a:avLst/>
+          </a:prstGeom>
+          <a:solidFill>
+            <a:schemeClr val="accent5">
+              <a:lumMod val="40000"/>
+              <a:lumOff val="60000"/>
+            </a:schemeClr>
+          </a:solidFill>
+        </p:spPr>
+        <p:style>
+          <a:lnRef idx="2">
+            <a:schemeClr val="accent3">
+              <a:shade val="50000"/>
+            </a:schemeClr>
+          </a:lnRef>
+          <a:fillRef idx="1">
+            <a:schemeClr val="accent3"/>
+          </a:fillRef>
+          <a:effectRef idx="0">
+            <a:schemeClr val="accent3"/>
+          </a:effectRef>
+          <a:fontRef idx="minor">
+            <a:schemeClr val="lt1"/>
+          </a:fontRef>
+        </p:style>
+        <p:txBody>
+          <a:bodyPr rtlCol="0" anchor="ctr"/>
+          <a:lstStyle/>
+          <a:p>
+            <a:pPr algn="ctr"/>
+            <a:endParaRPr lang="zh-CN" altLang="en-US" dirty="0"/>
+          </a:p>
+        </p:txBody>
+      </p:sp>
+      <p:sp>
+        <p:nvSpPr>
+          <p:cNvPr id="53" name="文本框 52">
+            <a:extLst>
+              <a:ext uri="{FF2B5EF4-FFF2-40B4-BE49-F238E27FC236}">
+                <a16:creationId xmlns:a16="http://schemas.microsoft.com/office/drawing/2014/main" id="{9B1ECD9C-B6F1-44C2-A28B-7B224652F6A8}"/>
+              </a:ext>
+            </a:extLst>
+          </p:cNvPr>
+          <p:cNvSpPr txBox="1"/>
+          <p:nvPr/>
+        </p:nvSpPr>
+        <p:spPr>
+          <a:xfrm>
+            <a:off x="8981173" y="1542072"/>
+            <a:ext cx="1543988" cy="338554"/>
+          </a:xfrm>
+          <a:prstGeom prst="rect">
+            <a:avLst/>
+          </a:prstGeom>
+          <a:noFill/>
+        </p:spPr>
+        <p:txBody>
+          <a:bodyPr wrap="square" rtlCol="0">
+            <a:spAutoFit/>
+          </a:bodyPr>
+          <a:lstStyle/>
+          <a:p>
+            <a:r>
+              <a:rPr lang="en-US" altLang="zh-CN" sz="1600" dirty="0"/>
+              <a:t>Data Page 2</a:t>
+            </a:r>
+            <a:endParaRPr lang="zh-CN" altLang="en-US" sz="1600" dirty="0"/>
+          </a:p>
+        </p:txBody>
+      </p:sp>
+      <p:sp>
+        <p:nvSpPr>
+          <p:cNvPr id="54" name="矩形: 圆角 53">
+            <a:extLst>
+              <a:ext uri="{FF2B5EF4-FFF2-40B4-BE49-F238E27FC236}">
+                <a16:creationId xmlns:a16="http://schemas.microsoft.com/office/drawing/2014/main" id="{3A51E373-40A1-4D75-B33B-5075FCBCC9B2}"/>
+              </a:ext>
+            </a:extLst>
+          </p:cNvPr>
+          <p:cNvSpPr/>
+          <p:nvPr/>
+        </p:nvSpPr>
+        <p:spPr>
+          <a:xfrm>
+            <a:off x="8871194" y="2036260"/>
+            <a:ext cx="1763949" cy="380675"/>
+          </a:xfrm>
+          <a:prstGeom prst="roundRect">
+            <a:avLst/>
+          </a:prstGeom>
+        </p:spPr>
+        <p:style>
+          <a:lnRef idx="1">
+            <a:schemeClr val="accent4"/>
+          </a:lnRef>
+          <a:fillRef idx="2">
+            <a:schemeClr val="accent4"/>
+          </a:fillRef>
+          <a:effectRef idx="1">
+            <a:schemeClr val="accent4"/>
+          </a:effectRef>
+          <a:fontRef idx="minor">
+            <a:schemeClr val="dk1"/>
+          </a:fontRef>
+        </p:style>
+        <p:txBody>
+          <a:bodyPr rtlCol="0" anchor="ctr"/>
+          <a:lstStyle/>
+          <a:p>
+            <a:pPr algn="ctr"/>
+            <a:endParaRPr lang="zh-CN" altLang="en-US"/>
+          </a:p>
+        </p:txBody>
+      </p:sp>
+      <p:sp>
+        <p:nvSpPr>
+          <p:cNvPr id="55" name="文本框 54">
+            <a:extLst>
+              <a:ext uri="{FF2B5EF4-FFF2-40B4-BE49-F238E27FC236}">
+                <a16:creationId xmlns:a16="http://schemas.microsoft.com/office/drawing/2014/main" id="{D7009090-1465-4B03-825E-6AD6DE08081D}"/>
+              </a:ext>
+            </a:extLst>
+          </p:cNvPr>
+          <p:cNvSpPr txBox="1"/>
+          <p:nvPr/>
+        </p:nvSpPr>
+        <p:spPr>
+          <a:xfrm>
+            <a:off x="8871194" y="1963959"/>
+            <a:ext cx="1877168" cy="523220"/>
+          </a:xfrm>
+          <a:prstGeom prst="rect">
+            <a:avLst/>
+          </a:prstGeom>
+          <a:noFill/>
+        </p:spPr>
+        <p:txBody>
+          <a:bodyPr wrap="square" rtlCol="0">
+            <a:spAutoFit/>
+          </a:bodyPr>
+          <a:lstStyle/>
+          <a:p>
+            <a:r>
+              <a:rPr lang="en-US" altLang="zh-CN" sz="1600" dirty="0" err="1"/>
+              <a:t>nextFreePage</a:t>
+            </a:r>
+            <a:r>
+              <a:rPr lang="zh-CN" altLang="en-US" sz="1200" dirty="0"/>
+              <a:t>： </a:t>
+            </a:r>
+            <a:r>
+              <a:rPr lang="en-US" altLang="zh-CN" sz="1200" b="0" dirty="0">
+                <a:solidFill>
+                  <a:srgbClr val="569CD6"/>
+                </a:solidFill>
+                <a:effectLst/>
+                <a:latin typeface="Consolas" panose="020B0609020204030204" pitchFamily="49" charset="0"/>
+              </a:rPr>
+              <a:t>RM_NO_FREE_PAGE</a:t>
+            </a:r>
+            <a:endParaRPr lang="en-US" altLang="zh-CN" sz="1200" b="0" dirty="0">
+              <a:solidFill>
+                <a:srgbClr val="D4D4D4"/>
+              </a:solidFill>
+              <a:effectLst/>
+              <a:latin typeface="Consolas" panose="020B0609020204030204" pitchFamily="49" charset="0"/>
+            </a:endParaRPr>
+          </a:p>
+        </p:txBody>
+      </p:sp>
+      <p:sp>
+        <p:nvSpPr>
+          <p:cNvPr id="64" name="文本框 63">
+            <a:extLst>
+              <a:ext uri="{FF2B5EF4-FFF2-40B4-BE49-F238E27FC236}">
+                <a16:creationId xmlns:a16="http://schemas.microsoft.com/office/drawing/2014/main" id="{D11007AC-8A1C-4429-9A52-4A758F21ADDA}"/>
+              </a:ext>
+            </a:extLst>
+          </p:cNvPr>
+          <p:cNvSpPr txBox="1"/>
+          <p:nvPr/>
+        </p:nvSpPr>
+        <p:spPr>
+          <a:xfrm>
+            <a:off x="6669464" y="1963959"/>
+            <a:ext cx="1763949" cy="523220"/>
+          </a:xfrm>
+          <a:prstGeom prst="rect">
+            <a:avLst/>
+          </a:prstGeom>
+          <a:noFill/>
+        </p:spPr>
+        <p:txBody>
+          <a:bodyPr wrap="square" rtlCol="0">
+            <a:spAutoFit/>
+          </a:bodyPr>
+          <a:lstStyle/>
+          <a:p>
+            <a:r>
+              <a:rPr lang="en-US" altLang="zh-CN" sz="1600" dirty="0" err="1"/>
+              <a:t>nextFreePage</a:t>
+            </a:r>
+            <a:r>
+              <a:rPr lang="zh-CN" altLang="en-US" sz="1200" dirty="0"/>
+              <a:t>： </a:t>
+            </a:r>
+            <a:r>
+              <a:rPr lang="en-US" altLang="zh-CN" sz="1200" b="0" dirty="0">
+                <a:solidFill>
+                  <a:srgbClr val="569CD6"/>
+                </a:solidFill>
+                <a:effectLst/>
+                <a:latin typeface="Consolas" panose="020B0609020204030204" pitchFamily="49" charset="0"/>
+              </a:rPr>
+              <a:t>RM_PAGE_FULL_USED</a:t>
+            </a:r>
+            <a:endParaRPr lang="en-US" altLang="zh-CN" sz="1200" b="0" dirty="0">
+              <a:solidFill>
+                <a:srgbClr val="D4D4D4"/>
+              </a:solidFill>
+              <a:effectLst/>
+              <a:latin typeface="Consolas" panose="020B0609020204030204" pitchFamily="49" charset="0"/>
+            </a:endParaRPr>
+          </a:p>
+        </p:txBody>
+      </p:sp>
+      <p:sp>
+        <p:nvSpPr>
+          <p:cNvPr id="103" name="任意多边形: 形状 102">
+            <a:extLst>
+              <a:ext uri="{FF2B5EF4-FFF2-40B4-BE49-F238E27FC236}">
+                <a16:creationId xmlns:a16="http://schemas.microsoft.com/office/drawing/2014/main" id="{D21A4908-DB2B-40F5-B71F-4AD37DB234AE}"/>
+              </a:ext>
+            </a:extLst>
+          </p:cNvPr>
+          <p:cNvSpPr/>
+          <p:nvPr/>
+        </p:nvSpPr>
+        <p:spPr>
+          <a:xfrm>
+            <a:off x="6050632" y="1873797"/>
+            <a:ext cx="2823210" cy="171312"/>
+          </a:xfrm>
+          <a:custGeom>
+            <a:avLst/>
+            <a:gdLst>
+              <a:gd name="connsiteX0" fmla="*/ 0 w 2823210"/>
+              <a:gd name="connsiteY0" fmla="*/ 7620 h 34488"/>
+              <a:gd name="connsiteX1" fmla="*/ 2823210 w 2823210"/>
+              <a:gd name="connsiteY1" fmla="*/ 0 h 34488"/>
+              <a:gd name="connsiteX0" fmla="*/ 0 w 2823210"/>
+              <a:gd name="connsiteY0" fmla="*/ 788670 h 788670"/>
+              <a:gd name="connsiteX1" fmla="*/ 1257300 w 2823210"/>
+              <a:gd name="connsiteY1" fmla="*/ 0 h 788670"/>
+              <a:gd name="connsiteX2" fmla="*/ 2823210 w 2823210"/>
+              <a:gd name="connsiteY2" fmla="*/ 781050 h 788670"/>
+              <a:gd name="connsiteX0" fmla="*/ 0 w 2823210"/>
+              <a:gd name="connsiteY0" fmla="*/ 869131 h 869131"/>
+              <a:gd name="connsiteX1" fmla="*/ 1257300 w 2823210"/>
+              <a:gd name="connsiteY1" fmla="*/ 80461 h 869131"/>
+              <a:gd name="connsiteX2" fmla="*/ 2823210 w 2823210"/>
+              <a:gd name="connsiteY2" fmla="*/ 861511 h 869131"/>
+              <a:gd name="connsiteX0" fmla="*/ 0 w 2823210"/>
+              <a:gd name="connsiteY0" fmla="*/ 821381 h 821381"/>
+              <a:gd name="connsiteX1" fmla="*/ 1257300 w 2823210"/>
+              <a:gd name="connsiteY1" fmla="*/ 32711 h 821381"/>
+              <a:gd name="connsiteX2" fmla="*/ 2823210 w 2823210"/>
+              <a:gd name="connsiteY2" fmla="*/ 813761 h 821381"/>
+              <a:gd name="connsiteX0" fmla="*/ 0 w 2823210"/>
+              <a:gd name="connsiteY0" fmla="*/ 556545 h 556545"/>
+              <a:gd name="connsiteX1" fmla="*/ 1253490 w 2823210"/>
+              <a:gd name="connsiteY1" fmla="*/ 42195 h 556545"/>
+              <a:gd name="connsiteX2" fmla="*/ 2823210 w 2823210"/>
+              <a:gd name="connsiteY2" fmla="*/ 548925 h 556545"/>
+              <a:gd name="connsiteX0" fmla="*/ 0 w 2823210"/>
+              <a:gd name="connsiteY0" fmla="*/ 582641 h 582641"/>
+              <a:gd name="connsiteX1" fmla="*/ 1253490 w 2823210"/>
+              <a:gd name="connsiteY1" fmla="*/ 68291 h 582641"/>
+              <a:gd name="connsiteX2" fmla="*/ 2823210 w 2823210"/>
+              <a:gd name="connsiteY2" fmla="*/ 575021 h 582641"/>
+              <a:gd name="connsiteX0" fmla="*/ 0 w 2823210"/>
+              <a:gd name="connsiteY0" fmla="*/ 550577 h 550577"/>
+              <a:gd name="connsiteX1" fmla="*/ 1253490 w 2823210"/>
+              <a:gd name="connsiteY1" fmla="*/ 70517 h 550577"/>
+              <a:gd name="connsiteX2" fmla="*/ 2823210 w 2823210"/>
+              <a:gd name="connsiteY2" fmla="*/ 542957 h 550577"/>
+              <a:gd name="connsiteX0" fmla="*/ 0 w 2823210"/>
+              <a:gd name="connsiteY0" fmla="*/ 243250 h 243250"/>
+              <a:gd name="connsiteX1" fmla="*/ 1560564 w 2823210"/>
+              <a:gd name="connsiteY1" fmla="*/ 104384 h 243250"/>
+              <a:gd name="connsiteX2" fmla="*/ 2823210 w 2823210"/>
+              <a:gd name="connsiteY2" fmla="*/ 235630 h 243250"/>
+              <a:gd name="connsiteX0" fmla="*/ 0 w 2823210"/>
+              <a:gd name="connsiteY0" fmla="*/ 150733 h 151308"/>
+              <a:gd name="connsiteX1" fmla="*/ 1560564 w 2823210"/>
+              <a:gd name="connsiteY1" fmla="*/ 11867 h 151308"/>
+              <a:gd name="connsiteX2" fmla="*/ 2823210 w 2823210"/>
+              <a:gd name="connsiteY2" fmla="*/ 143113 h 151308"/>
+              <a:gd name="connsiteX0" fmla="*/ 0 w 2823210"/>
+              <a:gd name="connsiteY0" fmla="*/ 137655 h 138636"/>
+              <a:gd name="connsiteX1" fmla="*/ 1041949 w 2823210"/>
+              <a:gd name="connsiteY1" fmla="*/ 12436 h 138636"/>
+              <a:gd name="connsiteX2" fmla="*/ 2823210 w 2823210"/>
+              <a:gd name="connsiteY2" fmla="*/ 130035 h 138636"/>
+              <a:gd name="connsiteX0" fmla="*/ 0 w 2823210"/>
+              <a:gd name="connsiteY0" fmla="*/ 137655 h 138636"/>
+              <a:gd name="connsiteX1" fmla="*/ 1041949 w 2823210"/>
+              <a:gd name="connsiteY1" fmla="*/ 12436 h 138636"/>
+              <a:gd name="connsiteX2" fmla="*/ 2823210 w 2823210"/>
+              <a:gd name="connsiteY2" fmla="*/ 130035 h 138636"/>
+              <a:gd name="connsiteX0" fmla="*/ 0 w 2823210"/>
+              <a:gd name="connsiteY0" fmla="*/ 250066 h 250066"/>
+              <a:gd name="connsiteX1" fmla="*/ 1062421 w 2823210"/>
+              <a:gd name="connsiteY1" fmla="*/ 8841 h 250066"/>
+              <a:gd name="connsiteX2" fmla="*/ 2823210 w 2823210"/>
+              <a:gd name="connsiteY2" fmla="*/ 242446 h 250066"/>
+              <a:gd name="connsiteX0" fmla="*/ 0 w 2823210"/>
+              <a:gd name="connsiteY0" fmla="*/ 241227 h 241227"/>
+              <a:gd name="connsiteX1" fmla="*/ 1062421 w 2823210"/>
+              <a:gd name="connsiteY1" fmla="*/ 2 h 241227"/>
+              <a:gd name="connsiteX2" fmla="*/ 2823210 w 2823210"/>
+              <a:gd name="connsiteY2" fmla="*/ 233607 h 241227"/>
+              <a:gd name="connsiteX0" fmla="*/ 0 w 2823210"/>
+              <a:gd name="connsiteY0" fmla="*/ 166164 h 167981"/>
+              <a:gd name="connsiteX1" fmla="*/ 830409 w 2823210"/>
+              <a:gd name="connsiteY1" fmla="*/ 2 h 167981"/>
+              <a:gd name="connsiteX2" fmla="*/ 2823210 w 2823210"/>
+              <a:gd name="connsiteY2" fmla="*/ 158544 h 167981"/>
+              <a:gd name="connsiteX0" fmla="*/ 0 w 2823210"/>
+              <a:gd name="connsiteY0" fmla="*/ 170764 h 171312"/>
+              <a:gd name="connsiteX1" fmla="*/ 830409 w 2823210"/>
+              <a:gd name="connsiteY1" fmla="*/ 4602 h 171312"/>
+              <a:gd name="connsiteX2" fmla="*/ 2823210 w 2823210"/>
+              <a:gd name="connsiteY2" fmla="*/ 163144 h 171312"/>
+            </a:gdLst>
+            <a:ahLst/>
+            <a:cxnLst>
+              <a:cxn ang="0">
+                <a:pos x="connsiteX0" y="connsiteY0"/>
+              </a:cxn>
+              <a:cxn ang="0">
+                <a:pos x="connsiteX1" y="connsiteY1"/>
+              </a:cxn>
+              <a:cxn ang="0">
+                <a:pos x="connsiteX2" y="connsiteY2"/>
+              </a:cxn>
+            </a:cxnLst>
+            <a:rect l="l" t="t" r="r" b="b"/>
+            <a:pathLst>
+              <a:path w="2823210" h="171312">
+                <a:moveTo>
+                  <a:pt x="0" y="170764"/>
+                </a:moveTo>
+                <a:cubicBezTo>
+                  <a:pt x="27305" y="170764"/>
+                  <a:pt x="796278" y="4602"/>
+                  <a:pt x="830409" y="4602"/>
+                </a:cubicBezTo>
+                <a:cubicBezTo>
+                  <a:pt x="2690371" y="-37085"/>
+                  <a:pt x="2377440" y="219659"/>
+                  <a:pt x="2823210" y="163144"/>
+                </a:cubicBezTo>
+              </a:path>
+            </a:pathLst>
+          </a:custGeom>
+          <a:noFill/>
+          <a:ln>
+            <a:prstDash val="sysDot"/>
+            <a:tailEnd type="triangle"/>
+          </a:ln>
+        </p:spPr>
+        <p:style>
+          <a:lnRef idx="2">
+            <a:schemeClr val="accent1">
+              <a:shade val="50000"/>
+            </a:schemeClr>
+          </a:lnRef>
+          <a:fillRef idx="1">
+            <a:schemeClr val="accent1"/>
+          </a:fillRef>
+          <a:effectRef idx="0">
+            <a:schemeClr val="accent1"/>
+          </a:effectRef>
+          <a:fontRef idx="minor">
+            <a:schemeClr val="lt1"/>
+          </a:fontRef>
+        </p:style>
+        <p:txBody>
+          <a:bodyPr rtlCol="0" anchor="ctr"/>
+          <a:lstStyle/>
+          <a:p>
+            <a:pPr algn="ctr"/>
+            <a:endParaRPr lang="zh-CN" altLang="en-US"/>
+          </a:p>
+        </p:txBody>
+      </p:sp>
+      <p:sp>
+        <p:nvSpPr>
+          <p:cNvPr id="104" name="任意多边形: 形状 103">
+            <a:extLst>
+              <a:ext uri="{FF2B5EF4-FFF2-40B4-BE49-F238E27FC236}">
+                <a16:creationId xmlns:a16="http://schemas.microsoft.com/office/drawing/2014/main" id="{B3DFF9D9-A3A2-4E09-A6B4-8CB320212F8F}"/>
+              </a:ext>
+            </a:extLst>
+          </p:cNvPr>
+          <p:cNvSpPr/>
+          <p:nvPr/>
+        </p:nvSpPr>
+        <p:spPr>
+          <a:xfrm>
+            <a:off x="3883075" y="2213178"/>
+            <a:ext cx="400345" cy="45719"/>
+          </a:xfrm>
+          <a:custGeom>
+            <a:avLst/>
+            <a:gdLst>
+              <a:gd name="connsiteX0" fmla="*/ 0 w 2823210"/>
+              <a:gd name="connsiteY0" fmla="*/ 7620 h 34488"/>
+              <a:gd name="connsiteX1" fmla="*/ 2823210 w 2823210"/>
+              <a:gd name="connsiteY1" fmla="*/ 0 h 34488"/>
+              <a:gd name="connsiteX0" fmla="*/ 0 w 2823210"/>
+              <a:gd name="connsiteY0" fmla="*/ 788670 h 788670"/>
+              <a:gd name="connsiteX1" fmla="*/ 1257300 w 2823210"/>
+              <a:gd name="connsiteY1" fmla="*/ 0 h 788670"/>
+              <a:gd name="connsiteX2" fmla="*/ 2823210 w 2823210"/>
+              <a:gd name="connsiteY2" fmla="*/ 781050 h 788670"/>
+              <a:gd name="connsiteX0" fmla="*/ 0 w 2823210"/>
+              <a:gd name="connsiteY0" fmla="*/ 869131 h 869131"/>
+              <a:gd name="connsiteX1" fmla="*/ 1257300 w 2823210"/>
+              <a:gd name="connsiteY1" fmla="*/ 80461 h 869131"/>
+              <a:gd name="connsiteX2" fmla="*/ 2823210 w 2823210"/>
+              <a:gd name="connsiteY2" fmla="*/ 861511 h 869131"/>
+              <a:gd name="connsiteX0" fmla="*/ 0 w 2823210"/>
+              <a:gd name="connsiteY0" fmla="*/ 821381 h 821381"/>
+              <a:gd name="connsiteX1" fmla="*/ 1257300 w 2823210"/>
+              <a:gd name="connsiteY1" fmla="*/ 32711 h 821381"/>
+              <a:gd name="connsiteX2" fmla="*/ 2823210 w 2823210"/>
+              <a:gd name="connsiteY2" fmla="*/ 813761 h 821381"/>
+              <a:gd name="connsiteX0" fmla="*/ 0 w 2823210"/>
+              <a:gd name="connsiteY0" fmla="*/ 556545 h 556545"/>
+              <a:gd name="connsiteX1" fmla="*/ 1253490 w 2823210"/>
+              <a:gd name="connsiteY1" fmla="*/ 42195 h 556545"/>
+              <a:gd name="connsiteX2" fmla="*/ 2823210 w 2823210"/>
+              <a:gd name="connsiteY2" fmla="*/ 548925 h 556545"/>
+              <a:gd name="connsiteX0" fmla="*/ 0 w 2823210"/>
+              <a:gd name="connsiteY0" fmla="*/ 582641 h 582641"/>
+              <a:gd name="connsiteX1" fmla="*/ 1253490 w 2823210"/>
+              <a:gd name="connsiteY1" fmla="*/ 68291 h 582641"/>
+              <a:gd name="connsiteX2" fmla="*/ 2823210 w 2823210"/>
+              <a:gd name="connsiteY2" fmla="*/ 575021 h 582641"/>
+              <a:gd name="connsiteX0" fmla="*/ 0 w 2823210"/>
+              <a:gd name="connsiteY0" fmla="*/ 550577 h 550577"/>
+              <a:gd name="connsiteX1" fmla="*/ 1253490 w 2823210"/>
+              <a:gd name="connsiteY1" fmla="*/ 70517 h 550577"/>
+              <a:gd name="connsiteX2" fmla="*/ 2823210 w 2823210"/>
+              <a:gd name="connsiteY2" fmla="*/ 542957 h 550577"/>
+            </a:gdLst>
+            <a:ahLst/>
+            <a:cxnLst>
+              <a:cxn ang="0">
+                <a:pos x="connsiteX0" y="connsiteY0"/>
+              </a:cxn>
+              <a:cxn ang="0">
+                <a:pos x="connsiteX1" y="connsiteY1"/>
+              </a:cxn>
+              <a:cxn ang="0">
+                <a:pos x="connsiteX2" y="connsiteY2"/>
+              </a:cxn>
+            </a:cxnLst>
+            <a:rect l="l" t="t" r="r" b="b"/>
+            <a:pathLst>
+              <a:path w="2823210" h="550577">
+                <a:moveTo>
+                  <a:pt x="0" y="550577"/>
+                </a:moveTo>
+                <a:cubicBezTo>
+                  <a:pt x="27305" y="550577"/>
+                  <a:pt x="1219359" y="70517"/>
+                  <a:pt x="1253490" y="70517"/>
+                </a:cubicBezTo>
+                <a:cubicBezTo>
+                  <a:pt x="2335530" y="-244126"/>
+                  <a:pt x="2377440" y="599472"/>
+                  <a:pt x="2823210" y="542957"/>
+                </a:cubicBezTo>
+              </a:path>
+            </a:pathLst>
+          </a:custGeom>
+          <a:noFill/>
+          <a:ln>
+            <a:prstDash val="sysDot"/>
+            <a:tailEnd type="triangle"/>
+          </a:ln>
+        </p:spPr>
+        <p:style>
+          <a:lnRef idx="2">
+            <a:schemeClr val="accent1">
+              <a:shade val="50000"/>
+            </a:schemeClr>
+          </a:lnRef>
+          <a:fillRef idx="1">
+            <a:schemeClr val="accent1"/>
+          </a:fillRef>
+          <a:effectRef idx="0">
+            <a:schemeClr val="accent1"/>
+          </a:effectRef>
+          <a:fontRef idx="minor">
+            <a:schemeClr val="lt1"/>
+          </a:fontRef>
+        </p:style>
+        <p:txBody>
+          <a:bodyPr rtlCol="0" anchor="ctr"/>
+          <a:lstStyle/>
+          <a:p>
+            <a:pPr algn="ctr"/>
+            <a:endParaRPr lang="zh-CN" altLang="en-US"/>
+          </a:p>
+        </p:txBody>
+      </p:sp>
+      <p:sp>
+        <p:nvSpPr>
+          <p:cNvPr id="32" name="文本框 31">
+            <a:extLst>
+              <a:ext uri="{FF2B5EF4-FFF2-40B4-BE49-F238E27FC236}">
+                <a16:creationId xmlns:a16="http://schemas.microsoft.com/office/drawing/2014/main" id="{97FF81F8-95BD-4311-9613-62F34071C3F0}"/>
+              </a:ext>
+            </a:extLst>
+          </p:cNvPr>
+          <p:cNvSpPr txBox="1"/>
+          <p:nvPr/>
+        </p:nvSpPr>
+        <p:spPr>
+          <a:xfrm>
+            <a:off x="2479797" y="4018639"/>
+            <a:ext cx="1016320" cy="338554"/>
+          </a:xfrm>
+          <a:prstGeom prst="rect">
+            <a:avLst/>
+          </a:prstGeom>
+          <a:noFill/>
+        </p:spPr>
+        <p:txBody>
+          <a:bodyPr wrap="square" rtlCol="0">
+            <a:spAutoFit/>
+          </a:bodyPr>
+          <a:lstStyle/>
+          <a:p>
+            <a:r>
+              <a:rPr lang="en-US" altLang="zh-CN" sz="1600" dirty="0"/>
+              <a:t>reserved</a:t>
+            </a:r>
+            <a:endParaRPr lang="zh-CN" altLang="en-US" sz="1600" dirty="0"/>
+          </a:p>
+        </p:txBody>
+      </p:sp>
+      <p:sp>
+        <p:nvSpPr>
+          <p:cNvPr id="34" name="文本框 33">
+            <a:extLst>
+              <a:ext uri="{FF2B5EF4-FFF2-40B4-BE49-F238E27FC236}">
+                <a16:creationId xmlns:a16="http://schemas.microsoft.com/office/drawing/2014/main" id="{1CB1D988-3DAB-40FB-8259-2D88FF4F2A83}"/>
+              </a:ext>
+            </a:extLst>
+          </p:cNvPr>
+          <p:cNvSpPr txBox="1"/>
+          <p:nvPr/>
+        </p:nvSpPr>
+        <p:spPr>
+          <a:xfrm>
+            <a:off x="4609624" y="4015328"/>
+            <a:ext cx="1173961" cy="338554"/>
+          </a:xfrm>
+          <a:prstGeom prst="rect">
+            <a:avLst/>
+          </a:prstGeom>
+          <a:noFill/>
+        </p:spPr>
+        <p:txBody>
+          <a:bodyPr wrap="square" rtlCol="0">
+            <a:spAutoFit/>
+          </a:bodyPr>
+          <a:lstStyle/>
+          <a:p>
+            <a:r>
+              <a:rPr lang="en-US" altLang="zh-CN" sz="1600" dirty="0"/>
+              <a:t>free space</a:t>
+            </a:r>
+            <a:endParaRPr lang="zh-CN" altLang="en-US" sz="1600" dirty="0"/>
+          </a:p>
+        </p:txBody>
+      </p:sp>
+      <p:sp>
+        <p:nvSpPr>
+          <p:cNvPr id="37" name="文本框 36">
+            <a:extLst>
+              <a:ext uri="{FF2B5EF4-FFF2-40B4-BE49-F238E27FC236}">
+                <a16:creationId xmlns:a16="http://schemas.microsoft.com/office/drawing/2014/main" id="{88BF17D7-D509-4611-BD99-732916021432}"/>
+              </a:ext>
+            </a:extLst>
+          </p:cNvPr>
+          <p:cNvSpPr txBox="1"/>
+          <p:nvPr/>
+        </p:nvSpPr>
+        <p:spPr>
+          <a:xfrm>
+            <a:off x="9166187" y="4015328"/>
+            <a:ext cx="1173961" cy="338554"/>
+          </a:xfrm>
+          <a:prstGeom prst="rect">
+            <a:avLst/>
+          </a:prstGeom>
+          <a:noFill/>
+        </p:spPr>
+        <p:txBody>
+          <a:bodyPr wrap="square" rtlCol="0">
+            <a:spAutoFit/>
+          </a:bodyPr>
+          <a:lstStyle/>
+          <a:p>
+            <a:r>
+              <a:rPr lang="en-US" altLang="zh-CN" sz="1600" dirty="0"/>
+              <a:t>free space</a:t>
+            </a:r>
+            <a:endParaRPr lang="zh-CN" altLang="en-US" sz="1600" dirty="0"/>
+          </a:p>
+        </p:txBody>
+      </p:sp>
+      <p:sp>
+        <p:nvSpPr>
+          <p:cNvPr id="38" name="文本框 37">
+            <a:extLst>
+              <a:ext uri="{FF2B5EF4-FFF2-40B4-BE49-F238E27FC236}">
+                <a16:creationId xmlns:a16="http://schemas.microsoft.com/office/drawing/2014/main" id="{C7F55271-D972-4781-9FD6-2227F15C7361}"/>
+              </a:ext>
+            </a:extLst>
+          </p:cNvPr>
+          <p:cNvSpPr txBox="1"/>
+          <p:nvPr/>
+        </p:nvSpPr>
+        <p:spPr>
+          <a:xfrm>
+            <a:off x="3025580" y="613454"/>
+            <a:ext cx="6280670" cy="584775"/>
+          </a:xfrm>
+          <a:prstGeom prst="rect">
+            <a:avLst/>
+          </a:prstGeom>
+          <a:noFill/>
+        </p:spPr>
+        <p:txBody>
+          <a:bodyPr wrap="square" rtlCol="0">
+            <a:spAutoFit/>
+          </a:bodyPr>
+          <a:lstStyle/>
+          <a:p>
+            <a:r>
+              <a:rPr lang="en-US" altLang="zh-CN" sz="3200" b="1" dirty="0"/>
+              <a:t>Record Management Structure</a:t>
+            </a:r>
+            <a:endParaRPr lang="zh-CN" altLang="en-US" sz="3200" b="1" dirty="0"/>
+          </a:p>
+        </p:txBody>
+      </p:sp>
+      <p:sp>
+        <p:nvSpPr>
+          <p:cNvPr id="39" name="文本框 38">
+            <a:extLst>
+              <a:ext uri="{FF2B5EF4-FFF2-40B4-BE49-F238E27FC236}">
+                <a16:creationId xmlns:a16="http://schemas.microsoft.com/office/drawing/2014/main" id="{BA20A569-5EDD-4026-AF6C-C2B201B47F10}"/>
+              </a:ext>
+            </a:extLst>
+          </p:cNvPr>
+          <p:cNvSpPr txBox="1"/>
+          <p:nvPr/>
+        </p:nvSpPr>
+        <p:spPr>
+          <a:xfrm>
+            <a:off x="2353202" y="1542072"/>
+            <a:ext cx="1269509" cy="338554"/>
+          </a:xfrm>
+          <a:prstGeom prst="rect">
+            <a:avLst/>
+          </a:prstGeom>
+          <a:noFill/>
+        </p:spPr>
+        <p:txBody>
+          <a:bodyPr wrap="square" rtlCol="0">
+            <a:spAutoFit/>
+          </a:bodyPr>
+          <a:lstStyle/>
+          <a:p>
+            <a:r>
+              <a:rPr lang="en-US" altLang="zh-CN" sz="1600" dirty="0">
+                <a:solidFill>
+                  <a:srgbClr val="FF0000"/>
+                </a:solidFill>
+              </a:rPr>
+              <a:t>Meta Page</a:t>
+            </a:r>
+            <a:endParaRPr lang="zh-CN" altLang="en-US" sz="1600" dirty="0">
+              <a:solidFill>
+                <a:srgbClr val="FF0000"/>
+              </a:solidFill>
+            </a:endParaRPr>
+          </a:p>
+        </p:txBody>
+      </p:sp>
+      <p:cxnSp>
+        <p:nvCxnSpPr>
+          <p:cNvPr id="41" name="直接连接符 40">
+            <a:extLst>
+              <a:ext uri="{FF2B5EF4-FFF2-40B4-BE49-F238E27FC236}">
+                <a16:creationId xmlns:a16="http://schemas.microsoft.com/office/drawing/2014/main" id="{5C519886-FC3A-42B0-9B43-9E661493BF06}"/>
+              </a:ext>
+            </a:extLst>
+          </p:cNvPr>
+          <p:cNvCxnSpPr>
+            <a:cxnSpLocks/>
+          </p:cNvCxnSpPr>
+          <p:nvPr/>
+        </p:nvCxnSpPr>
+        <p:spPr>
+          <a:xfrm>
+            <a:off x="2119126" y="2808913"/>
+            <a:ext cx="1763949" cy="0"/>
+          </a:xfrm>
+          <a:prstGeom prst="line">
+            <a:avLst/>
+          </a:prstGeom>
+        </p:spPr>
+        <p:style>
+          <a:lnRef idx="1">
+            <a:schemeClr val="accent1"/>
+          </a:lnRef>
+          <a:fillRef idx="0">
+            <a:schemeClr val="accent1"/>
+          </a:fillRef>
+          <a:effectRef idx="0">
+            <a:schemeClr val="accent1"/>
+          </a:effectRef>
+          <a:fontRef idx="minor">
+            <a:schemeClr val="tx1"/>
+          </a:fontRef>
+        </p:style>
+      </p:cxnSp>
+      <p:cxnSp>
+        <p:nvCxnSpPr>
+          <p:cNvPr id="42" name="直接连接符 41">
+            <a:extLst>
+              <a:ext uri="{FF2B5EF4-FFF2-40B4-BE49-F238E27FC236}">
+                <a16:creationId xmlns:a16="http://schemas.microsoft.com/office/drawing/2014/main" id="{A647F25A-1A8D-42E4-92CB-F0626A5EDD41}"/>
+              </a:ext>
+            </a:extLst>
+          </p:cNvPr>
+          <p:cNvCxnSpPr>
+            <a:cxnSpLocks/>
+          </p:cNvCxnSpPr>
+          <p:nvPr/>
+        </p:nvCxnSpPr>
+        <p:spPr>
+          <a:xfrm>
+            <a:off x="2105985" y="3149273"/>
+            <a:ext cx="1763949" cy="0"/>
+          </a:xfrm>
+          <a:prstGeom prst="line">
+            <a:avLst/>
+          </a:prstGeom>
+        </p:spPr>
+        <p:style>
+          <a:lnRef idx="1">
+            <a:schemeClr val="accent1"/>
+          </a:lnRef>
+          <a:fillRef idx="0">
+            <a:schemeClr val="accent1"/>
+          </a:fillRef>
+          <a:effectRef idx="0">
+            <a:schemeClr val="accent1"/>
+          </a:effectRef>
+          <a:fontRef idx="minor">
+            <a:schemeClr val="tx1"/>
+          </a:fontRef>
+        </p:style>
+      </p:cxnSp>
+      <p:sp>
+        <p:nvSpPr>
+          <p:cNvPr id="56" name="文本框 55">
+            <a:extLst>
+              <a:ext uri="{FF2B5EF4-FFF2-40B4-BE49-F238E27FC236}">
+                <a16:creationId xmlns:a16="http://schemas.microsoft.com/office/drawing/2014/main" id="{56F1BF2C-61F0-4AF0-B4C0-3AA4DE0D35DC}"/>
+              </a:ext>
+            </a:extLst>
+          </p:cNvPr>
+          <p:cNvSpPr txBox="1"/>
+          <p:nvPr/>
+        </p:nvSpPr>
+        <p:spPr>
+          <a:xfrm>
+            <a:off x="2099374" y="2825333"/>
+            <a:ext cx="2601702" cy="307777"/>
+          </a:xfrm>
+          <a:prstGeom prst="rect">
+            <a:avLst/>
+          </a:prstGeom>
+          <a:noFill/>
+        </p:spPr>
+        <p:txBody>
+          <a:bodyPr wrap="square" rtlCol="0">
+            <a:spAutoFit/>
+          </a:bodyPr>
+          <a:lstStyle/>
+          <a:p>
+            <a:r>
+              <a:rPr lang="en-US" altLang="zh-CN" sz="1400" dirty="0" err="1"/>
+              <a:t>numPages</a:t>
+            </a:r>
+            <a:r>
+              <a:rPr lang="zh-CN" altLang="en-US" sz="1400" dirty="0"/>
+              <a:t>：</a:t>
+            </a:r>
+            <a:r>
+              <a:rPr lang="en-US" altLang="zh-CN" sz="1400" dirty="0"/>
+              <a:t>3</a:t>
+            </a:r>
+            <a:endParaRPr lang="zh-CN" altLang="en-US" sz="1400" dirty="0"/>
+          </a:p>
+        </p:txBody>
+      </p:sp>
+      <p:sp>
+        <p:nvSpPr>
+          <p:cNvPr id="57" name="文本框 56">
+            <a:extLst>
+              <a:ext uri="{FF2B5EF4-FFF2-40B4-BE49-F238E27FC236}">
+                <a16:creationId xmlns:a16="http://schemas.microsoft.com/office/drawing/2014/main" id="{B02EF17F-2671-481B-A74A-E3018DFD1000}"/>
+              </a:ext>
+            </a:extLst>
+          </p:cNvPr>
+          <p:cNvSpPr txBox="1"/>
+          <p:nvPr/>
+        </p:nvSpPr>
+        <p:spPr>
+          <a:xfrm>
+            <a:off x="2121758" y="3176014"/>
+            <a:ext cx="2601702" cy="307777"/>
+          </a:xfrm>
+          <a:prstGeom prst="rect">
+            <a:avLst/>
+          </a:prstGeom>
+          <a:noFill/>
+        </p:spPr>
+        <p:txBody>
+          <a:bodyPr wrap="square" rtlCol="0">
+            <a:spAutoFit/>
+          </a:bodyPr>
+          <a:lstStyle/>
+          <a:p>
+            <a:r>
+              <a:rPr lang="en-US" altLang="zh-CN" sz="1400" dirty="0" err="1"/>
+              <a:t>nextFreePage</a:t>
+            </a:r>
+            <a:r>
+              <a:rPr lang="en-US" altLang="zh-CN" sz="1400" dirty="0"/>
+              <a:t>: 0</a:t>
+            </a:r>
+            <a:endParaRPr lang="zh-CN" altLang="en-US" sz="1400" dirty="0"/>
+          </a:p>
+        </p:txBody>
+      </p:sp>
+      <p:sp>
+        <p:nvSpPr>
+          <p:cNvPr id="2" name="矩形 1">
+            <a:extLst>
+              <a:ext uri="{FF2B5EF4-FFF2-40B4-BE49-F238E27FC236}">
+                <a16:creationId xmlns:a16="http://schemas.microsoft.com/office/drawing/2014/main" id="{706F83A6-EA31-4DEF-8574-757B9ED2D956}"/>
+              </a:ext>
+            </a:extLst>
+          </p:cNvPr>
+          <p:cNvSpPr/>
+          <p:nvPr/>
+        </p:nvSpPr>
+        <p:spPr>
+          <a:xfrm>
+            <a:off x="4287007" y="2417120"/>
+            <a:ext cx="1763949" cy="1393063"/>
+          </a:xfrm>
+          <a:prstGeom prst="rect">
+            <a:avLst/>
+          </a:prstGeom>
+          <a:ln/>
+        </p:spPr>
+        <p:style>
+          <a:lnRef idx="0">
+            <a:schemeClr val="accent3"/>
+          </a:lnRef>
+          <a:fillRef idx="3">
+            <a:schemeClr val="accent3"/>
+          </a:fillRef>
+          <a:effectRef idx="3">
+            <a:schemeClr val="accent3"/>
+          </a:effectRef>
+          <a:fontRef idx="minor">
+            <a:schemeClr val="lt1"/>
+          </a:fontRef>
+        </p:style>
+        <p:txBody>
+          <a:bodyPr rtlCol="0" anchor="ctr"/>
+          <a:lstStyle/>
+          <a:p>
+            <a:pPr algn="ctr"/>
+            <a:r>
+              <a:rPr lang="en-US" altLang="zh-CN" dirty="0"/>
+              <a:t>bitmap</a:t>
+            </a:r>
+            <a:endParaRPr lang="zh-CN" altLang="en-US" dirty="0"/>
+          </a:p>
+        </p:txBody>
+      </p:sp>
+      <p:sp>
+        <p:nvSpPr>
+          <p:cNvPr id="47" name="矩形 46">
+            <a:extLst>
+              <a:ext uri="{FF2B5EF4-FFF2-40B4-BE49-F238E27FC236}">
+                <a16:creationId xmlns:a16="http://schemas.microsoft.com/office/drawing/2014/main" id="{A4260CAD-EBFD-4AE9-B6F8-6DF6D95A4E0D}"/>
+              </a:ext>
+            </a:extLst>
+          </p:cNvPr>
+          <p:cNvSpPr/>
+          <p:nvPr/>
+        </p:nvSpPr>
+        <p:spPr>
+          <a:xfrm>
+            <a:off x="6665878" y="2411450"/>
+            <a:ext cx="1763949" cy="1393063"/>
+          </a:xfrm>
+          <a:prstGeom prst="rect">
+            <a:avLst/>
+          </a:prstGeom>
+          <a:ln/>
+        </p:spPr>
+        <p:style>
+          <a:lnRef idx="0">
+            <a:schemeClr val="accent3"/>
+          </a:lnRef>
+          <a:fillRef idx="3">
+            <a:schemeClr val="accent3"/>
+          </a:fillRef>
+          <a:effectRef idx="3">
+            <a:schemeClr val="accent3"/>
+          </a:effectRef>
+          <a:fontRef idx="minor">
+            <a:schemeClr val="lt1"/>
+          </a:fontRef>
+        </p:style>
+        <p:txBody>
+          <a:bodyPr rtlCol="0" anchor="ctr"/>
+          <a:lstStyle/>
+          <a:p>
+            <a:pPr algn="ctr"/>
+            <a:r>
+              <a:rPr lang="en-US" altLang="zh-CN" dirty="0"/>
+              <a:t>bitmap</a:t>
+            </a:r>
+            <a:endParaRPr lang="zh-CN" altLang="en-US" dirty="0"/>
+          </a:p>
+        </p:txBody>
+      </p:sp>
+      <p:sp>
+        <p:nvSpPr>
+          <p:cNvPr id="58" name="矩形 57">
+            <a:extLst>
+              <a:ext uri="{FF2B5EF4-FFF2-40B4-BE49-F238E27FC236}">
+                <a16:creationId xmlns:a16="http://schemas.microsoft.com/office/drawing/2014/main" id="{4067D0E9-1FA2-458C-B916-ECD02568D0BD}"/>
+              </a:ext>
+            </a:extLst>
+          </p:cNvPr>
+          <p:cNvSpPr/>
+          <p:nvPr/>
+        </p:nvSpPr>
+        <p:spPr>
+          <a:xfrm>
+            <a:off x="8871194" y="2416934"/>
+            <a:ext cx="1763949" cy="1393063"/>
+          </a:xfrm>
+          <a:prstGeom prst="rect">
+            <a:avLst/>
+          </a:prstGeom>
+          <a:ln/>
+        </p:spPr>
+        <p:style>
+          <a:lnRef idx="0">
+            <a:schemeClr val="accent3"/>
+          </a:lnRef>
+          <a:fillRef idx="3">
+            <a:schemeClr val="accent3"/>
+          </a:fillRef>
+          <a:effectRef idx="3">
+            <a:schemeClr val="accent3"/>
+          </a:effectRef>
+          <a:fontRef idx="minor">
+            <a:schemeClr val="lt1"/>
+          </a:fontRef>
+        </p:style>
+        <p:txBody>
+          <a:bodyPr rtlCol="0" anchor="ctr"/>
+          <a:lstStyle/>
+          <a:p>
+            <a:pPr algn="ctr"/>
+            <a:r>
+              <a:rPr lang="en-US" altLang="zh-CN" dirty="0"/>
+              <a:t>bitmap</a:t>
+            </a:r>
+            <a:endParaRPr lang="zh-CN" altLang="en-US" dirty="0"/>
+          </a:p>
+        </p:txBody>
+      </p:sp>
+    </p:spTree>
+    <p:extLst>
+      <p:ext uri="{BB962C8B-B14F-4D97-AF65-F5344CB8AC3E}">
+        <p14:creationId xmlns:p14="http://schemas.microsoft.com/office/powerpoint/2010/main" val="457232376"/>
+      </p:ext>
+    </p:extLst>
+  </p:cSld>
+  <p:clrMapOvr>
+    <a:masterClrMapping/>
+  </p:clrMapOvr>
+</p:sld>
+</file>
+
 <file path=ppt/theme/theme1.xml><?xml version="1.0" encoding="utf-8"?>
 <a:theme xmlns:a="http://schemas.openxmlformats.org/drawingml/2006/main" name="Office 主题​​">
   <a:themeElements>

</xml_diff>